<commit_message>
Updated to match colab
</commit_message>
<xml_diff>
--- a/Deliverables/Poster/CS230_FinalPoster.pptx
+++ b/Deliverables/Poster/CS230_FinalPoster.pptx
@@ -531,7 +531,7 @@
               <a:pPr>
                 <a:defRPr/>
               </a:pPr>
-              <a:t>2018/3/15</a:t>
+              <a:t>2018/3/16</a:t>
             </a:fld>
             <a:endParaRPr lang="zh-TW" altLang="en-US"/>
           </a:p>
@@ -1373,7 +1373,7 @@
               <a:pPr>
                 <a:defRPr/>
               </a:pPr>
-              <a:t>2018/3/15</a:t>
+              <a:t>2018/3/16</a:t>
             </a:fld>
             <a:endParaRPr lang="zh-TW" altLang="en-US"/>
           </a:p>
@@ -1588,7 +1588,7 @@
               <a:pPr>
                 <a:defRPr/>
               </a:pPr>
-              <a:t>2018/3/15</a:t>
+              <a:t>2018/3/16</a:t>
             </a:fld>
             <a:endParaRPr lang="zh-TW" altLang="en-US"/>
           </a:p>
@@ -1813,7 +1813,7 @@
               <a:pPr>
                 <a:defRPr/>
               </a:pPr>
-              <a:t>2018/3/15</a:t>
+              <a:t>2018/3/16</a:t>
             </a:fld>
             <a:endParaRPr lang="zh-TW" altLang="en-US"/>
           </a:p>
@@ -2028,7 +2028,7 @@
               <a:pPr>
                 <a:defRPr/>
               </a:pPr>
-              <a:t>2018/3/15</a:t>
+              <a:t>2018/3/16</a:t>
             </a:fld>
             <a:endParaRPr lang="zh-TW" altLang="en-US"/>
           </a:p>
@@ -2319,7 +2319,7 @@
               <a:pPr>
                 <a:defRPr/>
               </a:pPr>
-              <a:t>2018/3/15</a:t>
+              <a:t>2018/3/16</a:t>
             </a:fld>
             <a:endParaRPr lang="zh-TW" altLang="en-US"/>
           </a:p>
@@ -2652,7 +2652,7 @@
               <a:pPr>
                 <a:defRPr/>
               </a:pPr>
-              <a:t>2018/3/15</a:t>
+              <a:t>2018/3/16</a:t>
             </a:fld>
             <a:endParaRPr lang="zh-TW" altLang="en-US"/>
           </a:p>
@@ -3119,7 +3119,7 @@
               <a:pPr>
                 <a:defRPr/>
               </a:pPr>
-              <a:t>2018/3/15</a:t>
+              <a:t>2018/3/16</a:t>
             </a:fld>
             <a:endParaRPr lang="zh-TW" altLang="en-US"/>
           </a:p>
@@ -3282,7 +3282,7 @@
               <a:pPr>
                 <a:defRPr/>
               </a:pPr>
-              <a:t>2018/3/15</a:t>
+              <a:t>2018/3/16</a:t>
             </a:fld>
             <a:endParaRPr lang="zh-TW" altLang="en-US"/>
           </a:p>
@@ -3422,7 +3422,7 @@
               <a:pPr>
                 <a:defRPr/>
               </a:pPr>
-              <a:t>2018/3/15</a:t>
+              <a:t>2018/3/16</a:t>
             </a:fld>
             <a:endParaRPr lang="zh-TW" altLang="en-US"/>
           </a:p>
@@ -3744,7 +3744,7 @@
               <a:pPr>
                 <a:defRPr/>
               </a:pPr>
-              <a:t>2018/3/15</a:t>
+              <a:t>2018/3/16</a:t>
             </a:fld>
             <a:endParaRPr lang="zh-TW" altLang="en-US"/>
           </a:p>
@@ -4045,7 +4045,7 @@
               <a:pPr>
                 <a:defRPr/>
               </a:pPr>
-              <a:t>2018/3/15</a:t>
+              <a:t>2018/3/16</a:t>
             </a:fld>
             <a:endParaRPr lang="zh-TW" altLang="en-US"/>
           </a:p>
@@ -4369,7 +4369,7 @@
               <a:pPr>
                 <a:defRPr/>
               </a:pPr>
-              <a:t>2018/3/15</a:t>
+              <a:t>2018/3/16</a:t>
             </a:fld>
             <a:endParaRPr lang="zh-TW" altLang="en-US"/>
           </a:p>
@@ -7853,7 +7853,7 @@
         </p:blipFill>
         <p:spPr>
           <a:xfrm>
-            <a:off x="13106400" y="10969690"/>
+            <a:off x="13030200" y="10969690"/>
             <a:ext cx="2970931" cy="10366310"/>
           </a:xfrm>
           <a:prstGeom prst="rect">
@@ -7877,8 +7877,8 @@
             </p:nvSpPr>
             <p:spPr>
               <a:xfrm>
-                <a:off x="7467600" y="11074242"/>
-                <a:ext cx="5715000" cy="9501062"/>
+                <a:off x="7431374" y="10903925"/>
+                <a:ext cx="5715000" cy="10660675"/>
               </a:xfrm>
               <a:prstGeom prst="rect">
                 <a:avLst/>
@@ -7901,7 +7901,7 @@
                 </a:r>
               </a:p>
               <a:p>
-                <a:endParaRPr lang="en-US" sz="2800" b="1" dirty="0"/>
+                <a:endParaRPr lang="en-US" sz="2000" b="1" dirty="0"/>
               </a:p>
               <a:p>
                 <a:pPr marL="457200" indent="-457200">
@@ -7914,7 +7914,7 @@
                 </a:r>
               </a:p>
               <a:p>
-                <a:endParaRPr lang="en-US" sz="2800" dirty="0"/>
+                <a:endParaRPr lang="en-US" sz="2000" dirty="0"/>
               </a:p>
               <a:p>
                 <a:pPr marL="457200" indent="-457200">
@@ -7927,7 +7927,7 @@
                 </a:r>
               </a:p>
               <a:p>
-                <a:endParaRPr lang="en-US" sz="2800" dirty="0"/>
+                <a:endParaRPr lang="en-US" sz="2000" dirty="0"/>
               </a:p>
               <a:p>
                 <a:pPr marL="457200" indent="-457200">
@@ -7940,7 +7940,7 @@
                 </a:r>
               </a:p>
               <a:p>
-                <a:endParaRPr lang="en-US" sz="2800" dirty="0"/>
+                <a:endParaRPr lang="en-US" sz="2000" dirty="0"/>
               </a:p>
               <a:p>
                 <a:pPr marL="457200" indent="-457200">
@@ -7949,7 +7949,7 @@
                 </a:pPr>
                 <a:r>
                   <a:rPr lang="en-US" sz="2800" dirty="0"/>
-                  <a:t>Mini-Batch Size of 32</a:t>
+                  <a:t>Mini-Batch Size of 64</a:t>
                 </a:r>
               </a:p>
               <a:p>
@@ -8027,7 +8027,7 @@
                 <a:endParaRPr lang="en-US" sz="2800" dirty="0"/>
               </a:p>
               <a:p>
-                <a:endParaRPr lang="en-US" sz="2800" dirty="0"/>
+                <a:endParaRPr lang="en-US" sz="2000" dirty="0"/>
               </a:p>
               <a:p>
                 <a:pPr marL="457200" indent="-457200">
@@ -8059,7 +8059,7 @@
                 <a:endParaRPr lang="en-US" sz="2800" dirty="0"/>
               </a:p>
               <a:p>
-                <a:endParaRPr lang="en-US" sz="2800" dirty="0"/>
+                <a:endParaRPr lang="en-US" sz="2000" dirty="0"/>
               </a:p>
               <a:p>
                 <a:pPr marL="457200" indent="-457200">
@@ -8210,21 +8210,14 @@
                         <a:latin typeface="Cambria Math" panose="02040503050406030204" pitchFamily="18" charset="0"/>
                         <a:ea typeface="Cambria Math" panose="02040503050406030204" pitchFamily="18" charset="0"/>
                       </a:rPr>
-                      <m:t>=</m:t>
-                    </m:r>
-                    <m:r>
-                      <a:rPr lang="en-US" sz="2600" i="1">
-                        <a:latin typeface="Cambria Math" panose="02040503050406030204" pitchFamily="18" charset="0"/>
-                        <a:ea typeface="Cambria Math" panose="02040503050406030204" pitchFamily="18" charset="0"/>
-                      </a:rPr>
-                      <m:t>0.00001</m:t>
+                      <m:t>=0.00001</m:t>
                     </m:r>
                   </m:oMath>
                 </a14:m>
                 <a:endParaRPr lang="en-US" sz="2600" dirty="0"/>
               </a:p>
               <a:p>
-                <a:endParaRPr lang="en-US" sz="2800" dirty="0"/>
+                <a:endParaRPr lang="en-US" sz="2000" dirty="0"/>
               </a:p>
               <a:p>
                 <a:pPr marL="342900" indent="-342900">
@@ -8253,6 +8246,193 @@
                 </a14:m>
                 <a:endParaRPr lang="en-US" sz="2800" dirty="0"/>
               </a:p>
+              <a:p>
+                <a:endParaRPr lang="en-US" sz="2000" dirty="0"/>
+              </a:p>
+              <a:p>
+                <a:pPr marL="342900" indent="-342900">
+                  <a:buFont typeface="Arial" panose="020B0604020202020204" pitchFamily="34" charset="0"/>
+                  <a:buChar char="•"/>
+                </a:pPr>
+                <a:r>
+                  <a:rPr lang="en-US" sz="2800" dirty="0"/>
+                  <a:t>Tuned </a:t>
+                </a:r>
+                <a:r>
+                  <a:rPr lang="en-US" sz="2800" dirty="0" err="1"/>
+                  <a:t>hyperparams</a:t>
+                </a:r>
+                <a:r>
+                  <a:rPr lang="en-US" sz="2800" dirty="0"/>
+                  <a:t> in space </a:t>
+                </a:r>
+                <a14:m>
+                  <m:oMath xmlns:m="http://schemas.openxmlformats.org/officeDocument/2006/math">
+                    <m:r>
+                      <a:rPr lang="en-US" sz="2400" b="0" i="1" smtClean="0">
+                        <a:latin typeface="Cambria Math" panose="02040503050406030204" pitchFamily="18" charset="0"/>
+                      </a:rPr>
+                      <m:t>𝑁</m:t>
+                    </m:r>
+                    <m:r>
+                      <a:rPr lang="en-US" sz="2400" b="0" i="1" smtClean="0">
+                        <a:latin typeface="Cambria Math" panose="02040503050406030204" pitchFamily="18" charset="0"/>
+                      </a:rPr>
+                      <m:t>=</m:t>
+                    </m:r>
+                    <m:d>
+                      <m:dPr>
+                        <m:begChr m:val="["/>
+                        <m:endChr m:val="]"/>
+                        <m:ctrlPr>
+                          <a:rPr lang="en-US" sz="2400" b="0" i="1" smtClean="0">
+                            <a:latin typeface="Cambria Math" panose="02040503050406030204" pitchFamily="18" charset="0"/>
+                          </a:rPr>
+                        </m:ctrlPr>
+                      </m:dPr>
+                      <m:e>
+                        <m:r>
+                          <a:rPr lang="en-US" sz="2400" b="0" i="1" smtClean="0">
+                            <a:latin typeface="Cambria Math" panose="02040503050406030204" pitchFamily="18" charset="0"/>
+                          </a:rPr>
+                          <m:t>2,4,7,10</m:t>
+                        </m:r>
+                      </m:e>
+                    </m:d>
+                    <m:r>
+                      <a:rPr lang="en-US" sz="2400" i="1">
+                        <a:latin typeface="Cambria Math" panose="02040503050406030204" pitchFamily="18" charset="0"/>
+                      </a:rPr>
+                      <m:t>, </m:t>
+                    </m:r>
+                    <m:r>
+                      <a:rPr lang="en-US" sz="2400" b="0" i="1" smtClean="0">
+                        <a:latin typeface="Cambria Math" panose="02040503050406030204" pitchFamily="18" charset="0"/>
+                      </a:rPr>
+                      <m:t> </m:t>
+                    </m:r>
+                    <m:r>
+                      <a:rPr lang="en-US" sz="2400" i="1">
+                        <a:latin typeface="Cambria Math" panose="02040503050406030204" pitchFamily="18" charset="0"/>
+                        <a:ea typeface="Cambria Math" panose="02040503050406030204" pitchFamily="18" charset="0"/>
+                      </a:rPr>
+                      <m:t>𝜆</m:t>
+                    </m:r>
+                    <m:r>
+                      <a:rPr lang="en-US" sz="2400" i="1">
+                        <a:latin typeface="Cambria Math" panose="02040503050406030204" pitchFamily="18" charset="0"/>
+                        <a:ea typeface="Cambria Math" panose="02040503050406030204" pitchFamily="18" charset="0"/>
+                      </a:rPr>
+                      <m:t>=</m:t>
+                    </m:r>
+                    <m:d>
+                      <m:dPr>
+                        <m:begChr m:val="["/>
+                        <m:endChr m:val="]"/>
+                        <m:ctrlPr>
+                          <a:rPr lang="en-US" sz="2400" i="1">
+                            <a:latin typeface="Cambria Math" panose="02040503050406030204" pitchFamily="18" charset="0"/>
+                            <a:ea typeface="Cambria Math" panose="02040503050406030204" pitchFamily="18" charset="0"/>
+                          </a:rPr>
+                        </m:ctrlPr>
+                      </m:dPr>
+                      <m:e>
+                        <m:r>
+                          <a:rPr lang="en-US" sz="2400" i="1">
+                            <a:latin typeface="Cambria Math" panose="02040503050406030204" pitchFamily="18" charset="0"/>
+                            <a:ea typeface="Cambria Math" panose="02040503050406030204" pitchFamily="18" charset="0"/>
+                          </a:rPr>
+                          <m:t>0,.1,.3,.5,.7,1</m:t>
+                        </m:r>
+                      </m:e>
+                    </m:d>
+                    <m:r>
+                      <a:rPr lang="en-US" sz="2400" b="0" i="1" smtClean="0">
+                        <a:latin typeface="Cambria Math" panose="02040503050406030204" pitchFamily="18" charset="0"/>
+                        <a:ea typeface="Cambria Math" panose="02040503050406030204" pitchFamily="18" charset="0"/>
+                      </a:rPr>
+                      <m:t>,  </m:t>
+                    </m:r>
+                    <m:r>
+                      <a:rPr lang="en-US" sz="2400" i="1">
+                        <a:latin typeface="Cambria Math" panose="02040503050406030204" pitchFamily="18" charset="0"/>
+                      </a:rPr>
+                      <m:t>𝐿</m:t>
+                    </m:r>
+                    <m:r>
+                      <a:rPr lang="en-US" sz="2400" i="1">
+                        <a:latin typeface="Cambria Math" panose="02040503050406030204" pitchFamily="18" charset="0"/>
+                      </a:rPr>
+                      <m:t>=</m:t>
+                    </m:r>
+                    <m:d>
+                      <m:dPr>
+                        <m:begChr m:val="["/>
+                        <m:endChr m:val="]"/>
+                        <m:ctrlPr>
+                          <a:rPr lang="en-US" sz="2400" i="1">
+                            <a:latin typeface="Cambria Math" panose="02040503050406030204" pitchFamily="18" charset="0"/>
+                          </a:rPr>
+                        </m:ctrlPr>
+                      </m:dPr>
+                      <m:e>
+                        <m:r>
+                          <a:rPr lang="en-US" sz="2400" i="1">
+                            <a:latin typeface="Cambria Math" panose="02040503050406030204" pitchFamily="18" charset="0"/>
+                          </a:rPr>
+                          <m:t>10,100,390,500,1000</m:t>
+                        </m:r>
+                      </m:e>
+                    </m:d>
+                  </m:oMath>
+                </a14:m>
+                <a:r>
+                  <a:rPr lang="en-US" sz="2800" dirty="0"/>
+                  <a:t>, </a:t>
+                </a:r>
+                <a14:m>
+                  <m:oMath xmlns:m="http://schemas.openxmlformats.org/officeDocument/2006/math">
+                    <m:r>
+                      <a:rPr lang="en-US" sz="2400" i="1">
+                        <a:latin typeface="Cambria Math" panose="02040503050406030204" pitchFamily="18" charset="0"/>
+                      </a:rPr>
+                      <m:t>𝐵𝑎𝑡𝑐h𝑠𝑖𝑧𝑒</m:t>
+                    </m:r>
+                    <m:r>
+                      <a:rPr lang="en-US" sz="2400" i="1">
+                        <a:latin typeface="Cambria Math" panose="02040503050406030204" pitchFamily="18" charset="0"/>
+                      </a:rPr>
+                      <m:t>=</m:t>
+                    </m:r>
+                    <m:d>
+                      <m:dPr>
+                        <m:begChr m:val="["/>
+                        <m:endChr m:val="]"/>
+                        <m:ctrlPr>
+                          <a:rPr lang="en-US" sz="2400" i="1">
+                            <a:latin typeface="Cambria Math" panose="02040503050406030204" pitchFamily="18" charset="0"/>
+                          </a:rPr>
+                        </m:ctrlPr>
+                      </m:dPr>
+                      <m:e>
+                        <m:r>
+                          <a:rPr lang="en-US" sz="2400" i="1">
+                            <a:latin typeface="Cambria Math" panose="02040503050406030204" pitchFamily="18" charset="0"/>
+                          </a:rPr>
+                          <m:t>16,32,64,256</m:t>
+                        </m:r>
+                      </m:e>
+                    </m:d>
+                    <m:r>
+                      <a:rPr lang="en-US" sz="2400" i="1">
+                        <a:latin typeface="Cambria Math" panose="02040503050406030204" pitchFamily="18" charset="0"/>
+                      </a:rPr>
+                      <m:t> </m:t>
+                    </m:r>
+                  </m:oMath>
+                </a14:m>
+                <a:endParaRPr lang="en-US" sz="2800" dirty="0"/>
+              </a:p>
             </p:txBody>
           </p:sp>
         </mc:Choice>
@@ -8273,8 +8453,8 @@
             </p:nvSpPr>
             <p:spPr>
               <a:xfrm>
-                <a:off x="7467600" y="11074242"/>
-                <a:ext cx="5715000" cy="9501062"/>
+                <a:off x="7431374" y="10903925"/>
+                <a:ext cx="5715000" cy="10660675"/>
               </a:xfrm>
               <a:prstGeom prst="rect">
                 <a:avLst/>
@@ -8282,7 +8462,7 @@
               <a:blipFill>
                 <a:blip r:embed="rId19"/>
                 <a:stretch>
-                  <a:fillRect l="-2132" t="-706"/>
+                  <a:fillRect l="-2132" t="-629"/>
                 </a:stretch>
               </a:blipFill>
             </p:spPr>

</xml_diff>